<commit_message>
Updated slides and mockup
</commit_message>
<xml_diff>
--- a/Release 0.1/Release01_CAPx.pptx
+++ b/Release 0.1/Release01_CAPx.pptx
@@ -11,10 +11,11 @@
     <p:sldId id="262" r:id="rId5"/>
     <p:sldId id="263" r:id="rId6"/>
     <p:sldId id="264" r:id="rId7"/>
-    <p:sldId id="265" r:id="rId8"/>
-    <p:sldId id="266" r:id="rId9"/>
-    <p:sldId id="267" r:id="rId10"/>
-    <p:sldId id="269" r:id="rId11"/>
+    <p:sldId id="270" r:id="rId8"/>
+    <p:sldId id="265" r:id="rId9"/>
+    <p:sldId id="266" r:id="rId10"/>
+    <p:sldId id="267" r:id="rId11"/>
+    <p:sldId id="269" r:id="rId12"/>
   </p:sldIdLst>
   <p:sldSz cx="9144000" cy="6858000" type="screen4x3"/>
   <p:notesSz cx="6858000" cy="9144000"/>
@@ -3572,21 +3573,7 @@
                 <a:ea typeface="Droid Sans" panose="020B0606030804020204" pitchFamily="34" charset="0"/>
                 <a:cs typeface="Droid Sans" panose="020B0606030804020204" pitchFamily="34" charset="0"/>
               </a:rPr>
-              <a:t>Steven Truong -  Jose Recendez  -  Alex </a:t>
-            </a:r>
-            <a:r>
-              <a:rPr lang="en-US" cap="none" dirty="0" smtClean="0">
-                <a:solidFill>
-                  <a:schemeClr val="tx1">
-                    <a:lumMod val="85000"/>
-                    <a:lumOff val="15000"/>
-                  </a:schemeClr>
-                </a:solidFill>
-                <a:latin typeface="Miramonte" panose="020B0502030504020203" pitchFamily="34" charset="0"/>
-                <a:ea typeface="Droid Sans" panose="020B0606030804020204" pitchFamily="34" charset="0"/>
-                <a:cs typeface="Droid Sans" panose="020B0606030804020204" pitchFamily="34" charset="0"/>
-              </a:rPr>
-              <a:t>Neumann</a:t>
+              <a:t>Steven Truong -  Jose Recendez  -  Alex Neumann</a:t>
             </a:r>
           </a:p>
           <a:p>
@@ -3762,6 +3749,169 @@
               <a:rPr lang="en-US" cap="none" dirty="0" smtClean="0">
                 <a:latin typeface="Miramonte" panose="020B0502030504020203" pitchFamily="34" charset="0"/>
               </a:rPr>
+              <a:t>Task Board – Waffle.io</a:t>
+            </a:r>
+            <a:endParaRPr lang="en-US" cap="none" dirty="0">
+              <a:latin typeface="Miramonte" panose="020B0502030504020203" pitchFamily="34" charset="0"/>
+            </a:endParaRPr>
+          </a:p>
+        </p:txBody>
+      </p:sp>
+      <p:sp>
+        <p:nvSpPr>
+          <p:cNvPr id="3" name="Content Placeholder 2"/>
+          <p:cNvSpPr>
+            <a:spLocks noGrp="1"/>
+          </p:cNvSpPr>
+          <p:nvPr>
+            <p:ph idx="1"/>
+          </p:nvPr>
+        </p:nvSpPr>
+        <p:spPr/>
+        <p:txBody>
+          <a:bodyPr>
+            <a:normAutofit/>
+          </a:bodyPr>
+          <a:lstStyle/>
+          <a:p>
+            <a:r>
+              <a:rPr lang="en-US" dirty="0" smtClean="0">
+                <a:latin typeface="Miramonte" panose="020B0502030504020203" pitchFamily="34" charset="0"/>
+              </a:rPr>
+              <a:t>Task Board:</a:t>
+            </a:r>
+          </a:p>
+          <a:p>
+            <a:pPr marL="342900" indent="-342900">
+              <a:buFont typeface="Wingdings" panose="05000000000000000000" pitchFamily="2" charset="2"/>
+              <a:buChar char="§"/>
+            </a:pPr>
+            <a:r>
+              <a:rPr lang="en-US" dirty="0">
+                <a:latin typeface="Miramonte" panose="020B0502030504020203" pitchFamily="34" charset="0"/>
+                <a:hlinkClick r:id="rId2"/>
+              </a:rPr>
+              <a:t>https://</a:t>
+            </a:r>
+            <a:r>
+              <a:rPr lang="en-US" dirty="0" smtClean="0">
+                <a:latin typeface="Miramonte" panose="020B0502030504020203" pitchFamily="34" charset="0"/>
+                <a:hlinkClick r:id="rId2"/>
+              </a:rPr>
+              <a:t>waffle.io/asu-cis-capstone/capx</a:t>
+            </a:r>
+            <a:r>
+              <a:rPr lang="en-US" dirty="0" smtClean="0">
+                <a:latin typeface="Miramonte" panose="020B0502030504020203" pitchFamily="34" charset="0"/>
+              </a:rPr>
+              <a:t> </a:t>
+            </a:r>
+          </a:p>
+          <a:p>
+            <a:endParaRPr lang="en-US" dirty="0">
+              <a:latin typeface="Miramonte" panose="020B0502030504020203" pitchFamily="34" charset="0"/>
+            </a:endParaRPr>
+          </a:p>
+          <a:p>
+            <a:r>
+              <a:rPr lang="en-US" dirty="0" smtClean="0">
+                <a:latin typeface="Miramonte" panose="020B0502030504020203" pitchFamily="34" charset="0"/>
+              </a:rPr>
+              <a:t>GitHub Repo:</a:t>
+            </a:r>
+          </a:p>
+          <a:p>
+            <a:pPr marL="342900" indent="-342900">
+              <a:buFont typeface="Wingdings" panose="05000000000000000000" pitchFamily="2" charset="2"/>
+              <a:buChar char="§"/>
+            </a:pPr>
+            <a:r>
+              <a:rPr lang="en-US" dirty="0">
+                <a:latin typeface="Miramonte" panose="020B0502030504020203" pitchFamily="34" charset="0"/>
+                <a:hlinkClick r:id="rId3"/>
+              </a:rPr>
+              <a:t>https://</a:t>
+            </a:r>
+            <a:r>
+              <a:rPr lang="en-US" dirty="0" smtClean="0">
+                <a:latin typeface="Miramonte" panose="020B0502030504020203" pitchFamily="34" charset="0"/>
+                <a:hlinkClick r:id="rId3"/>
+              </a:rPr>
+              <a:t>github.com/asu-cis-capstone/capx</a:t>
+            </a:r>
+            <a:r>
+              <a:rPr lang="en-US" dirty="0" smtClean="0">
+                <a:latin typeface="Miramonte" panose="020B0502030504020203" pitchFamily="34" charset="0"/>
+              </a:rPr>
+              <a:t> </a:t>
+            </a:r>
+            <a:endParaRPr lang="en-US" dirty="0">
+              <a:latin typeface="Miramonte" panose="020B0502030504020203" pitchFamily="34" charset="0"/>
+            </a:endParaRPr>
+          </a:p>
+        </p:txBody>
+      </p:sp>
+    </p:spTree>
+    <p:extLst>
+      <p:ext uri="{BB962C8B-B14F-4D97-AF65-F5344CB8AC3E}">
+        <p14:creationId xmlns:p14="http://schemas.microsoft.com/office/powerpoint/2010/main" val="387430454"/>
+      </p:ext>
+    </p:extLst>
+  </p:cSld>
+  <p:clrMapOvr>
+    <a:masterClrMapping/>
+  </p:clrMapOvr>
+  <p:timing>
+    <p:tnLst>
+      <p:par>
+        <p:cTn id="1" dur="indefinite" restart="never" nodeType="tmRoot"/>
+      </p:par>
+    </p:tnLst>
+  </p:timing>
+</p:sld>
+</file>
+
+<file path=ppt/slides/slide11.xml><?xml version="1.0" encoding="utf-8"?>
+<p:sld xmlns:a="http://schemas.openxmlformats.org/drawingml/2006/main" xmlns:r="http://schemas.openxmlformats.org/officeDocument/2006/relationships" xmlns:p="http://schemas.openxmlformats.org/presentationml/2006/main">
+  <p:cSld>
+    <p:spTree>
+      <p:nvGrpSpPr>
+        <p:cNvPr id="1" name=""/>
+        <p:cNvGrpSpPr/>
+        <p:nvPr/>
+      </p:nvGrpSpPr>
+      <p:grpSpPr>
+        <a:xfrm>
+          <a:off x="0" y="0"/>
+          <a:ext cx="0" cy="0"/>
+          <a:chOff x="0" y="0"/>
+          <a:chExt cx="0" cy="0"/>
+        </a:xfrm>
+      </p:grpSpPr>
+      <p:sp>
+        <p:nvSpPr>
+          <p:cNvPr id="2" name="Title 1"/>
+          <p:cNvSpPr>
+            <a:spLocks noGrp="1"/>
+          </p:cNvSpPr>
+          <p:nvPr>
+            <p:ph type="title"/>
+          </p:nvPr>
+        </p:nvSpPr>
+        <p:spPr>
+          <a:xfrm>
+            <a:off x="457200" y="152718"/>
+            <a:ext cx="7924800" cy="1371600"/>
+          </a:xfrm>
+        </p:spPr>
+        <p:txBody>
+          <a:bodyPr/>
+          <a:lstStyle/>
+          <a:p>
+            <a:r>
+              <a:rPr lang="en-US" cap="none" dirty="0" smtClean="0">
+                <a:latin typeface="Miramonte" panose="020B0502030504020203" pitchFamily="34" charset="0"/>
+              </a:rPr>
               <a:t>Backup – Task Board screenshot</a:t>
             </a:r>
             <a:endParaRPr lang="en-US" cap="none" dirty="0">
@@ -4669,6 +4819,150 @@
           </a:p>
         </p:txBody>
       </p:sp>
+      <p:sp>
+        <p:nvSpPr>
+          <p:cNvPr id="3" name="Content Placeholder 2"/>
+          <p:cNvSpPr>
+            <a:spLocks noGrp="1"/>
+          </p:cNvSpPr>
+          <p:nvPr>
+            <p:ph idx="1"/>
+          </p:nvPr>
+        </p:nvSpPr>
+        <p:spPr/>
+        <p:txBody>
+          <a:bodyPr/>
+          <a:lstStyle/>
+          <a:p>
+            <a:endParaRPr lang="en-US"/>
+          </a:p>
+        </p:txBody>
+      </p:sp>
+      <p:pic>
+        <p:nvPicPr>
+          <p:cNvPr id="1026" name="Picture 2"/>
+          <p:cNvPicPr>
+            <a:picLocks noChangeAspect="1" noChangeArrowheads="1"/>
+          </p:cNvPicPr>
+          <p:nvPr/>
+        </p:nvPicPr>
+        <p:blipFill>
+          <a:blip r:embed="rId2">
+            <a:extLst>
+              <a:ext uri="{28A0092B-C50C-407E-A947-70E740481C1C}">
+                <a14:useLocalDpi xmlns:a14="http://schemas.microsoft.com/office/drawing/2010/main" val="0"/>
+              </a:ext>
+            </a:extLst>
+          </a:blip>
+          <a:srcRect/>
+          <a:stretch>
+            <a:fillRect/>
+          </a:stretch>
+        </p:blipFill>
+        <p:spPr bwMode="auto">
+          <a:xfrm>
+            <a:off x="533400" y="1371600"/>
+            <a:ext cx="7924800" cy="4212552"/>
+          </a:xfrm>
+          <a:prstGeom prst="rect">
+            <a:avLst/>
+          </a:prstGeom>
+          <a:noFill/>
+          <a:ln>
+            <a:noFill/>
+          </a:ln>
+          <a:extLst>
+            <a:ext uri="{909E8E84-426E-40DD-AFC4-6F175D3DCCD1}">
+              <a14:hiddenFill xmlns:a14="http://schemas.microsoft.com/office/drawing/2010/main">
+                <a:solidFill>
+                  <a:schemeClr val="accent1"/>
+                </a:solidFill>
+              </a14:hiddenFill>
+            </a:ext>
+            <a:ext uri="{91240B29-F687-4F45-9708-019B960494DF}">
+              <a14:hiddenLine xmlns:a14="http://schemas.microsoft.com/office/drawing/2010/main" w="9525">
+                <a:solidFill>
+                  <a:schemeClr val="tx1"/>
+                </a:solidFill>
+                <a:miter lim="800000"/>
+                <a:headEnd/>
+                <a:tailEnd/>
+              </a14:hiddenLine>
+            </a:ext>
+          </a:extLst>
+        </p:spPr>
+      </p:pic>
+    </p:spTree>
+    <p:extLst>
+      <p:ext uri="{BB962C8B-B14F-4D97-AF65-F5344CB8AC3E}">
+        <p14:creationId xmlns:p14="http://schemas.microsoft.com/office/powerpoint/2010/main" val="2885543516"/>
+      </p:ext>
+    </p:extLst>
+  </p:cSld>
+  <p:clrMapOvr>
+    <a:masterClrMapping/>
+  </p:clrMapOvr>
+  <p:timing>
+    <p:tnLst>
+      <p:par>
+        <p:cTn id="1" dur="indefinite" restart="never" nodeType="tmRoot"/>
+      </p:par>
+    </p:tnLst>
+  </p:timing>
+</p:sld>
+</file>
+
+<file path=ppt/slides/slide8.xml><?xml version="1.0" encoding="utf-8"?>
+<p:sld xmlns:a="http://schemas.openxmlformats.org/drawingml/2006/main" xmlns:r="http://schemas.openxmlformats.org/officeDocument/2006/relationships" xmlns:p="http://schemas.openxmlformats.org/presentationml/2006/main">
+  <p:cSld>
+    <p:spTree>
+      <p:nvGrpSpPr>
+        <p:cNvPr id="1" name=""/>
+        <p:cNvGrpSpPr/>
+        <p:nvPr/>
+      </p:nvGrpSpPr>
+      <p:grpSpPr>
+        <a:xfrm>
+          <a:off x="0" y="0"/>
+          <a:ext cx="0" cy="0"/>
+          <a:chOff x="0" y="0"/>
+          <a:chExt cx="0" cy="0"/>
+        </a:xfrm>
+      </p:grpSpPr>
+      <p:sp>
+        <p:nvSpPr>
+          <p:cNvPr id="2" name="Title 1"/>
+          <p:cNvSpPr>
+            <a:spLocks noGrp="1"/>
+          </p:cNvSpPr>
+          <p:nvPr>
+            <p:ph type="title"/>
+          </p:nvPr>
+        </p:nvSpPr>
+        <p:spPr>
+          <a:xfrm>
+            <a:off x="457200" y="152718"/>
+            <a:ext cx="7924800" cy="685482"/>
+          </a:xfrm>
+        </p:spPr>
+        <p:txBody>
+          <a:bodyPr>
+            <a:normAutofit/>
+          </a:bodyPr>
+          <a:lstStyle/>
+          <a:p>
+            <a:r>
+              <a:rPr lang="en-US" cap="none" dirty="0" smtClean="0">
+                <a:latin typeface="Miramonte" panose="020B0502030504020203" pitchFamily="34" charset="0"/>
+              </a:rPr>
+              <a:t>Mockups</a:t>
+            </a:r>
+            <a:endParaRPr lang="en-US" cap="none" dirty="0">
+              <a:latin typeface="Miramonte" panose="020B0502030504020203" pitchFamily="34" charset="0"/>
+            </a:endParaRPr>
+          </a:p>
+        </p:txBody>
+      </p:sp>
       <p:pic>
         <p:nvPicPr>
           <p:cNvPr id="4" name="Content Placeholder 3"/>
@@ -4717,7 +5011,7 @@
 </p:sld>
 </file>
 
-<file path=ppt/slides/slide8.xml><?xml version="1.0" encoding="utf-8"?>
+<file path=ppt/slides/slide9.xml><?xml version="1.0" encoding="utf-8"?>
 <p:sld xmlns:a="http://schemas.openxmlformats.org/drawingml/2006/main" xmlns:r="http://schemas.openxmlformats.org/officeDocument/2006/relationships" xmlns:p="http://schemas.openxmlformats.org/presentationml/2006/main">
   <p:cSld>
     <p:spTree>
@@ -4801,169 +5095,6 @@
     <p:extLst>
       <p:ext uri="{BB962C8B-B14F-4D97-AF65-F5344CB8AC3E}">
         <p14:creationId xmlns:p14="http://schemas.microsoft.com/office/powerpoint/2010/main" val="2800608505"/>
-      </p:ext>
-    </p:extLst>
-  </p:cSld>
-  <p:clrMapOvr>
-    <a:masterClrMapping/>
-  </p:clrMapOvr>
-  <p:timing>
-    <p:tnLst>
-      <p:par>
-        <p:cTn id="1" dur="indefinite" restart="never" nodeType="tmRoot"/>
-      </p:par>
-    </p:tnLst>
-  </p:timing>
-</p:sld>
-</file>
-
-<file path=ppt/slides/slide9.xml><?xml version="1.0" encoding="utf-8"?>
-<p:sld xmlns:a="http://schemas.openxmlformats.org/drawingml/2006/main" xmlns:r="http://schemas.openxmlformats.org/officeDocument/2006/relationships" xmlns:p="http://schemas.openxmlformats.org/presentationml/2006/main">
-  <p:cSld>
-    <p:spTree>
-      <p:nvGrpSpPr>
-        <p:cNvPr id="1" name=""/>
-        <p:cNvGrpSpPr/>
-        <p:nvPr/>
-      </p:nvGrpSpPr>
-      <p:grpSpPr>
-        <a:xfrm>
-          <a:off x="0" y="0"/>
-          <a:ext cx="0" cy="0"/>
-          <a:chOff x="0" y="0"/>
-          <a:chExt cx="0" cy="0"/>
-        </a:xfrm>
-      </p:grpSpPr>
-      <p:sp>
-        <p:nvSpPr>
-          <p:cNvPr id="2" name="Title 1"/>
-          <p:cNvSpPr>
-            <a:spLocks noGrp="1"/>
-          </p:cNvSpPr>
-          <p:nvPr>
-            <p:ph type="title"/>
-          </p:nvPr>
-        </p:nvSpPr>
-        <p:spPr>
-          <a:xfrm>
-            <a:off x="457200" y="152718"/>
-            <a:ext cx="7924800" cy="1371600"/>
-          </a:xfrm>
-        </p:spPr>
-        <p:txBody>
-          <a:bodyPr/>
-          <a:lstStyle/>
-          <a:p>
-            <a:r>
-              <a:rPr lang="en-US" cap="none" dirty="0" smtClean="0">
-                <a:latin typeface="Miramonte" panose="020B0502030504020203" pitchFamily="34" charset="0"/>
-              </a:rPr>
-              <a:t>Task Board – Waffle.io</a:t>
-            </a:r>
-            <a:endParaRPr lang="en-US" cap="none" dirty="0">
-              <a:latin typeface="Miramonte" panose="020B0502030504020203" pitchFamily="34" charset="0"/>
-            </a:endParaRPr>
-          </a:p>
-        </p:txBody>
-      </p:sp>
-      <p:sp>
-        <p:nvSpPr>
-          <p:cNvPr id="3" name="Content Placeholder 2"/>
-          <p:cNvSpPr>
-            <a:spLocks noGrp="1"/>
-          </p:cNvSpPr>
-          <p:nvPr>
-            <p:ph idx="1"/>
-          </p:nvPr>
-        </p:nvSpPr>
-        <p:spPr/>
-        <p:txBody>
-          <a:bodyPr>
-            <a:normAutofit/>
-          </a:bodyPr>
-          <a:lstStyle/>
-          <a:p>
-            <a:r>
-              <a:rPr lang="en-US" dirty="0" smtClean="0">
-                <a:latin typeface="Miramonte" panose="020B0502030504020203" pitchFamily="34" charset="0"/>
-              </a:rPr>
-              <a:t>Task Board:</a:t>
-            </a:r>
-          </a:p>
-          <a:p>
-            <a:pPr marL="342900" indent="-342900">
-              <a:buFont typeface="Wingdings" panose="05000000000000000000" pitchFamily="2" charset="2"/>
-              <a:buChar char="§"/>
-            </a:pPr>
-            <a:r>
-              <a:rPr lang="en-US" dirty="0">
-                <a:latin typeface="Miramonte" panose="020B0502030504020203" pitchFamily="34" charset="0"/>
-                <a:hlinkClick r:id="rId2"/>
-              </a:rPr>
-              <a:t>https://</a:t>
-            </a:r>
-            <a:r>
-              <a:rPr lang="en-US" dirty="0" smtClean="0">
-                <a:latin typeface="Miramonte" panose="020B0502030504020203" pitchFamily="34" charset="0"/>
-                <a:hlinkClick r:id="rId2"/>
-              </a:rPr>
-              <a:t>waffle.io/asu-cis-capstone/capx</a:t>
-            </a:r>
-            <a:r>
-              <a:rPr lang="en-US" dirty="0" smtClean="0">
-                <a:latin typeface="Miramonte" panose="020B0502030504020203" pitchFamily="34" charset="0"/>
-              </a:rPr>
-              <a:t> </a:t>
-            </a:r>
-          </a:p>
-          <a:p>
-            <a:endParaRPr lang="en-US" dirty="0">
-              <a:latin typeface="Miramonte" panose="020B0502030504020203" pitchFamily="34" charset="0"/>
-            </a:endParaRPr>
-          </a:p>
-          <a:p>
-            <a:r>
-              <a:rPr lang="en-US" dirty="0" smtClean="0">
-                <a:latin typeface="Miramonte" panose="020B0502030504020203" pitchFamily="34" charset="0"/>
-              </a:rPr>
-              <a:t>GitHub Repo:</a:t>
-            </a:r>
-          </a:p>
-          <a:p>
-            <a:pPr marL="342900" indent="-342900">
-              <a:buFont typeface="Wingdings" panose="05000000000000000000" pitchFamily="2" charset="2"/>
-              <a:buChar char="§"/>
-            </a:pPr>
-            <a:r>
-              <a:rPr lang="en-US" dirty="0">
-                <a:latin typeface="Miramonte" panose="020B0502030504020203" pitchFamily="34" charset="0"/>
-                <a:hlinkClick r:id="rId3"/>
-              </a:rPr>
-              <a:t>https://</a:t>
-            </a:r>
-            <a:r>
-              <a:rPr lang="en-US" dirty="0" smtClean="0">
-                <a:latin typeface="Miramonte" panose="020B0502030504020203" pitchFamily="34" charset="0"/>
-                <a:hlinkClick r:id="rId3"/>
-              </a:rPr>
-              <a:t>github.com/asu-cis-capstone/capx</a:t>
-            </a:r>
-            <a:r>
-              <a:rPr lang="en-US" dirty="0" smtClean="0">
-                <a:latin typeface="Miramonte" panose="020B0502030504020203" pitchFamily="34" charset="0"/>
-              </a:rPr>
-              <a:t> </a:t>
-            </a:r>
-            <a:endParaRPr lang="en-US" dirty="0">
-              <a:latin typeface="Miramonte" panose="020B0502030504020203" pitchFamily="34" charset="0"/>
-            </a:endParaRPr>
-          </a:p>
-        </p:txBody>
-      </p:sp>
-    </p:spTree>
-    <p:extLst>
-      <p:ext uri="{BB962C8B-B14F-4D97-AF65-F5344CB8AC3E}">
-        <p14:creationId xmlns:p14="http://schemas.microsoft.com/office/powerpoint/2010/main" val="387430454"/>
       </p:ext>
     </p:extLst>
   </p:cSld>

</xml_diff>